<commit_message>
Modificato file ppt interfaccia grafica
</commit_message>
<xml_diff>
--- a/Documentazione/Mockup/interfaccia_grafica.pptx
+++ b/Documentazione/Mockup/interfaccia_grafica.pptx
@@ -104,6 +104,11 @@
       </a:defRPr>
     </a:lvl9pPr>
   </p:defaultTextStyle>
+  <p:extLst>
+    <p:ext uri="{EFAFB233-063F-42B5-8137-9DF3F51BA10A}">
+      <p15:sldGuideLst xmlns:p15="http://schemas.microsoft.com/office/powerpoint/2012/main"/>
+    </p:ext>
+  </p:extLst>
 </p:presentation>
 </file>
 
@@ -238,7 +243,7 @@
           <a:p>
             <a:fld id="{29125CA0-5CAA-4412-B88E-D3582A4AAE2A}" type="datetimeFigureOut">
               <a:rPr lang="it-IT" smtClean="0"/>
-              <a:t>13/05/2021</a:t>
+              <a:t>14/05/2021</a:t>
             </a:fld>
             <a:endParaRPr lang="it-IT"/>
           </a:p>
@@ -408,7 +413,7 @@
           <a:p>
             <a:fld id="{29125CA0-5CAA-4412-B88E-D3582A4AAE2A}" type="datetimeFigureOut">
               <a:rPr lang="it-IT" smtClean="0"/>
-              <a:t>13/05/2021</a:t>
+              <a:t>14/05/2021</a:t>
             </a:fld>
             <a:endParaRPr lang="it-IT"/>
           </a:p>
@@ -588,7 +593,7 @@
           <a:p>
             <a:fld id="{29125CA0-5CAA-4412-B88E-D3582A4AAE2A}" type="datetimeFigureOut">
               <a:rPr lang="it-IT" smtClean="0"/>
-              <a:t>13/05/2021</a:t>
+              <a:t>14/05/2021</a:t>
             </a:fld>
             <a:endParaRPr lang="it-IT"/>
           </a:p>
@@ -758,7 +763,7 @@
           <a:p>
             <a:fld id="{29125CA0-5CAA-4412-B88E-D3582A4AAE2A}" type="datetimeFigureOut">
               <a:rPr lang="it-IT" smtClean="0"/>
-              <a:t>13/05/2021</a:t>
+              <a:t>14/05/2021</a:t>
             </a:fld>
             <a:endParaRPr lang="it-IT"/>
           </a:p>
@@ -1004,7 +1009,7 @@
           <a:p>
             <a:fld id="{29125CA0-5CAA-4412-B88E-D3582A4AAE2A}" type="datetimeFigureOut">
               <a:rPr lang="it-IT" smtClean="0"/>
-              <a:t>13/05/2021</a:t>
+              <a:t>14/05/2021</a:t>
             </a:fld>
             <a:endParaRPr lang="it-IT"/>
           </a:p>
@@ -1236,7 +1241,7 @@
           <a:p>
             <a:fld id="{29125CA0-5CAA-4412-B88E-D3582A4AAE2A}" type="datetimeFigureOut">
               <a:rPr lang="it-IT" smtClean="0"/>
-              <a:t>13/05/2021</a:t>
+              <a:t>14/05/2021</a:t>
             </a:fld>
             <a:endParaRPr lang="it-IT"/>
           </a:p>
@@ -1603,7 +1608,7 @@
           <a:p>
             <a:fld id="{29125CA0-5CAA-4412-B88E-D3582A4AAE2A}" type="datetimeFigureOut">
               <a:rPr lang="it-IT" smtClean="0"/>
-              <a:t>13/05/2021</a:t>
+              <a:t>14/05/2021</a:t>
             </a:fld>
             <a:endParaRPr lang="it-IT"/>
           </a:p>
@@ -1721,7 +1726,7 @@
           <a:p>
             <a:fld id="{29125CA0-5CAA-4412-B88E-D3582A4AAE2A}" type="datetimeFigureOut">
               <a:rPr lang="it-IT" smtClean="0"/>
-              <a:t>13/05/2021</a:t>
+              <a:t>14/05/2021</a:t>
             </a:fld>
             <a:endParaRPr lang="it-IT"/>
           </a:p>
@@ -1816,7 +1821,7 @@
           <a:p>
             <a:fld id="{29125CA0-5CAA-4412-B88E-D3582A4AAE2A}" type="datetimeFigureOut">
               <a:rPr lang="it-IT" smtClean="0"/>
-              <a:t>13/05/2021</a:t>
+              <a:t>14/05/2021</a:t>
             </a:fld>
             <a:endParaRPr lang="it-IT"/>
           </a:p>
@@ -2093,7 +2098,7 @@
           <a:p>
             <a:fld id="{29125CA0-5CAA-4412-B88E-D3582A4AAE2A}" type="datetimeFigureOut">
               <a:rPr lang="it-IT" smtClean="0"/>
-              <a:t>13/05/2021</a:t>
+              <a:t>14/05/2021</a:t>
             </a:fld>
             <a:endParaRPr lang="it-IT"/>
           </a:p>
@@ -2346,7 +2351,7 @@
           <a:p>
             <a:fld id="{29125CA0-5CAA-4412-B88E-D3582A4AAE2A}" type="datetimeFigureOut">
               <a:rPr lang="it-IT" smtClean="0"/>
-              <a:t>13/05/2021</a:t>
+              <a:t>14/05/2021</a:t>
             </a:fld>
             <a:endParaRPr lang="it-IT"/>
           </a:p>
@@ -2559,7 +2564,7 @@
           <a:p>
             <a:fld id="{29125CA0-5CAA-4412-B88E-D3582A4AAE2A}" type="datetimeFigureOut">
               <a:rPr lang="it-IT" smtClean="0"/>
-              <a:t>13/05/2021</a:t>
+              <a:t>14/05/2021</a:t>
             </a:fld>
             <a:endParaRPr lang="it-IT"/>
           </a:p>
@@ -3172,36 +3177,6 @@
           </a:fontRef>
         </p:style>
       </p:cxnSp>
-      <p:sp>
-        <p:nvSpPr>
-          <p:cNvPr id="11" name="CasellaDiTesto 10"/>
-          <p:cNvSpPr txBox="1"/>
-          <p:nvPr/>
-        </p:nvSpPr>
-        <p:spPr>
-          <a:xfrm>
-            <a:off x="4280807" y="1199178"/>
-            <a:ext cx="535724" cy="369332"/>
-          </a:xfrm>
-          <a:prstGeom prst="rect">
-            <a:avLst/>
-          </a:prstGeom>
-          <a:noFill/>
-        </p:spPr>
-        <p:txBody>
-          <a:bodyPr wrap="none" rtlCol="0">
-            <a:spAutoFit/>
-          </a:bodyPr>
-          <a:lstStyle/>
-          <a:p>
-            <a:r>
-              <a:rPr lang="it-IT" dirty="0" smtClean="0"/>
-              <a:t>379</a:t>
-            </a:r>
-            <a:endParaRPr lang="it-IT" dirty="0"/>
-          </a:p>
-        </p:txBody>
-      </p:sp>
       <p:cxnSp>
         <p:nvCxnSpPr>
           <p:cNvPr id="13" name="Connettore 1 12"/>
@@ -3264,36 +3239,6 @@
           </a:fontRef>
         </p:style>
       </p:cxnSp>
-      <p:sp>
-        <p:nvSpPr>
-          <p:cNvPr id="18" name="CasellaDiTesto 17"/>
-          <p:cNvSpPr txBox="1"/>
-          <p:nvPr/>
-        </p:nvSpPr>
-        <p:spPr>
-          <a:xfrm>
-            <a:off x="8264778" y="1199178"/>
-            <a:ext cx="535724" cy="369332"/>
-          </a:xfrm>
-          <a:prstGeom prst="rect">
-            <a:avLst/>
-          </a:prstGeom>
-          <a:noFill/>
-        </p:spPr>
-        <p:txBody>
-          <a:bodyPr wrap="none" rtlCol="0">
-            <a:spAutoFit/>
-          </a:bodyPr>
-          <a:lstStyle/>
-          <a:p>
-            <a:r>
-              <a:rPr lang="it-IT" dirty="0" smtClean="0"/>
-              <a:t>379</a:t>
-            </a:r>
-            <a:endParaRPr lang="it-IT" dirty="0"/>
-          </a:p>
-        </p:txBody>
-      </p:sp>
       <p:cxnSp>
         <p:nvCxnSpPr>
           <p:cNvPr id="19" name="Connettore 1 18"/>
@@ -3987,6 +3932,874 @@
           <a:p>
             <a:pPr algn="ctr"/>
             <a:endParaRPr lang="it-IT"/>
+          </a:p>
+        </p:txBody>
+      </p:sp>
+      <p:sp>
+        <p:nvSpPr>
+          <p:cNvPr id="2" name="Rettangolo 1"/>
+          <p:cNvSpPr/>
+          <p:nvPr/>
+        </p:nvSpPr>
+        <p:spPr>
+          <a:xfrm>
+            <a:off x="2982586" y="5094514"/>
+            <a:ext cx="1017914" cy="293915"/>
+          </a:xfrm>
+          <a:prstGeom prst="rect">
+            <a:avLst/>
+          </a:prstGeom>
+        </p:spPr>
+        <p:style>
+          <a:lnRef idx="2">
+            <a:schemeClr val="accent1">
+              <a:shade val="50000"/>
+            </a:schemeClr>
+          </a:lnRef>
+          <a:fillRef idx="1">
+            <a:schemeClr val="accent1"/>
+          </a:fillRef>
+          <a:effectRef idx="0">
+            <a:schemeClr val="accent1"/>
+          </a:effectRef>
+          <a:fontRef idx="minor">
+            <a:schemeClr val="lt1"/>
+          </a:fontRef>
+        </p:style>
+        <p:txBody>
+          <a:bodyPr rtlCol="0" anchor="ctr"/>
+          <a:lstStyle/>
+          <a:p>
+            <a:pPr algn="ctr"/>
+            <a:r>
+              <a:rPr lang="it-IT" sz="1400" dirty="0" smtClean="0"/>
+              <a:t>aggiungi</a:t>
+            </a:r>
+            <a:endParaRPr lang="it-IT" dirty="0"/>
+          </a:p>
+        </p:txBody>
+      </p:sp>
+      <p:sp>
+        <p:nvSpPr>
+          <p:cNvPr id="36" name="Rettangolo 35"/>
+          <p:cNvSpPr/>
+          <p:nvPr/>
+        </p:nvSpPr>
+        <p:spPr>
+          <a:xfrm>
+            <a:off x="4189589" y="5094514"/>
+            <a:ext cx="1017914" cy="293915"/>
+          </a:xfrm>
+          <a:prstGeom prst="rect">
+            <a:avLst/>
+          </a:prstGeom>
+        </p:spPr>
+        <p:style>
+          <a:lnRef idx="2">
+            <a:schemeClr val="accent1">
+              <a:shade val="50000"/>
+            </a:schemeClr>
+          </a:lnRef>
+          <a:fillRef idx="1">
+            <a:schemeClr val="accent1"/>
+          </a:fillRef>
+          <a:effectRef idx="0">
+            <a:schemeClr val="accent1"/>
+          </a:effectRef>
+          <a:fontRef idx="minor">
+            <a:schemeClr val="lt1"/>
+          </a:fontRef>
+        </p:style>
+        <p:txBody>
+          <a:bodyPr rtlCol="0" anchor="ctr"/>
+          <a:lstStyle/>
+          <a:p>
+            <a:pPr algn="ctr"/>
+            <a:r>
+              <a:rPr lang="it-IT" sz="1400" dirty="0" smtClean="0"/>
+              <a:t>modifica</a:t>
+            </a:r>
+            <a:endParaRPr lang="it-IT" dirty="0"/>
+          </a:p>
+        </p:txBody>
+      </p:sp>
+      <p:sp>
+        <p:nvSpPr>
+          <p:cNvPr id="38" name="Rettangolo 37"/>
+          <p:cNvSpPr/>
+          <p:nvPr/>
+        </p:nvSpPr>
+        <p:spPr>
+          <a:xfrm>
+            <a:off x="5375913" y="5097447"/>
+            <a:ext cx="1017914" cy="293915"/>
+          </a:xfrm>
+          <a:prstGeom prst="rect">
+            <a:avLst/>
+          </a:prstGeom>
+        </p:spPr>
+        <p:style>
+          <a:lnRef idx="2">
+            <a:schemeClr val="accent1">
+              <a:shade val="50000"/>
+            </a:schemeClr>
+          </a:lnRef>
+          <a:fillRef idx="1">
+            <a:schemeClr val="accent1"/>
+          </a:fillRef>
+          <a:effectRef idx="0">
+            <a:schemeClr val="accent1"/>
+          </a:effectRef>
+          <a:fontRef idx="minor">
+            <a:schemeClr val="lt1"/>
+          </a:fontRef>
+        </p:style>
+        <p:txBody>
+          <a:bodyPr rtlCol="0" anchor="ctr"/>
+          <a:lstStyle/>
+          <a:p>
+            <a:pPr algn="ctr"/>
+            <a:r>
+              <a:rPr lang="it-IT" sz="1400" dirty="0" smtClean="0"/>
+              <a:t>elimina</a:t>
+            </a:r>
+            <a:endParaRPr lang="it-IT" dirty="0"/>
+          </a:p>
+        </p:txBody>
+      </p:sp>
+      <p:sp>
+        <p:nvSpPr>
+          <p:cNvPr id="39" name="Rettangolo 38"/>
+          <p:cNvSpPr/>
+          <p:nvPr/>
+        </p:nvSpPr>
+        <p:spPr>
+          <a:xfrm>
+            <a:off x="6750404" y="5091986"/>
+            <a:ext cx="1017914" cy="293915"/>
+          </a:xfrm>
+          <a:prstGeom prst="rect">
+            <a:avLst/>
+          </a:prstGeom>
+        </p:spPr>
+        <p:style>
+          <a:lnRef idx="2">
+            <a:schemeClr val="accent1">
+              <a:shade val="50000"/>
+            </a:schemeClr>
+          </a:lnRef>
+          <a:fillRef idx="1">
+            <a:schemeClr val="accent1"/>
+          </a:fillRef>
+          <a:effectRef idx="0">
+            <a:schemeClr val="accent1"/>
+          </a:effectRef>
+          <a:fontRef idx="minor">
+            <a:schemeClr val="lt1"/>
+          </a:fontRef>
+        </p:style>
+        <p:txBody>
+          <a:bodyPr rtlCol="0" anchor="ctr"/>
+          <a:lstStyle/>
+          <a:p>
+            <a:pPr algn="ctr"/>
+            <a:r>
+              <a:rPr lang="it-IT" sz="1400" dirty="0" smtClean="0"/>
+              <a:t>aggiungi</a:t>
+            </a:r>
+            <a:endParaRPr lang="it-IT" dirty="0"/>
+          </a:p>
+        </p:txBody>
+      </p:sp>
+      <p:sp>
+        <p:nvSpPr>
+          <p:cNvPr id="42" name="Rettangolo 41"/>
+          <p:cNvSpPr/>
+          <p:nvPr/>
+        </p:nvSpPr>
+        <p:spPr>
+          <a:xfrm>
+            <a:off x="7957407" y="5091986"/>
+            <a:ext cx="1017914" cy="293915"/>
+          </a:xfrm>
+          <a:prstGeom prst="rect">
+            <a:avLst/>
+          </a:prstGeom>
+        </p:spPr>
+        <p:style>
+          <a:lnRef idx="2">
+            <a:schemeClr val="accent1">
+              <a:shade val="50000"/>
+            </a:schemeClr>
+          </a:lnRef>
+          <a:fillRef idx="1">
+            <a:schemeClr val="accent1"/>
+          </a:fillRef>
+          <a:effectRef idx="0">
+            <a:schemeClr val="accent1"/>
+          </a:effectRef>
+          <a:fontRef idx="minor">
+            <a:schemeClr val="lt1"/>
+          </a:fontRef>
+        </p:style>
+        <p:txBody>
+          <a:bodyPr rtlCol="0" anchor="ctr"/>
+          <a:lstStyle/>
+          <a:p>
+            <a:pPr algn="ctr"/>
+            <a:r>
+              <a:rPr lang="it-IT" sz="1400" dirty="0" smtClean="0"/>
+              <a:t>modifica</a:t>
+            </a:r>
+            <a:endParaRPr lang="it-IT" dirty="0"/>
+          </a:p>
+        </p:txBody>
+      </p:sp>
+      <p:sp>
+        <p:nvSpPr>
+          <p:cNvPr id="43" name="Rettangolo 42"/>
+          <p:cNvSpPr/>
+          <p:nvPr/>
+        </p:nvSpPr>
+        <p:spPr>
+          <a:xfrm>
+            <a:off x="9143731" y="5094919"/>
+            <a:ext cx="1017914" cy="293915"/>
+          </a:xfrm>
+          <a:prstGeom prst="rect">
+            <a:avLst/>
+          </a:prstGeom>
+        </p:spPr>
+        <p:style>
+          <a:lnRef idx="2">
+            <a:schemeClr val="accent1">
+              <a:shade val="50000"/>
+            </a:schemeClr>
+          </a:lnRef>
+          <a:fillRef idx="1">
+            <a:schemeClr val="accent1"/>
+          </a:fillRef>
+          <a:effectRef idx="0">
+            <a:schemeClr val="accent1"/>
+          </a:effectRef>
+          <a:fontRef idx="minor">
+            <a:schemeClr val="lt1"/>
+          </a:fontRef>
+        </p:style>
+        <p:txBody>
+          <a:bodyPr rtlCol="0" anchor="ctr"/>
+          <a:lstStyle/>
+          <a:p>
+            <a:pPr algn="ctr"/>
+            <a:r>
+              <a:rPr lang="it-IT" sz="1400" dirty="0" smtClean="0"/>
+              <a:t>elimina</a:t>
+            </a:r>
+            <a:endParaRPr lang="it-IT" dirty="0"/>
+          </a:p>
+        </p:txBody>
+      </p:sp>
+      <p:sp>
+        <p:nvSpPr>
+          <p:cNvPr id="45" name="Ovale 44"/>
+          <p:cNvSpPr/>
+          <p:nvPr/>
+        </p:nvSpPr>
+        <p:spPr>
+          <a:xfrm>
+            <a:off x="2936371" y="5071957"/>
+            <a:ext cx="136171" cy="117798"/>
+          </a:xfrm>
+          <a:prstGeom prst="ellipse">
+            <a:avLst/>
+          </a:prstGeom>
+        </p:spPr>
+        <p:style>
+          <a:lnRef idx="2">
+            <a:schemeClr val="accent2">
+              <a:shade val="50000"/>
+            </a:schemeClr>
+          </a:lnRef>
+          <a:fillRef idx="1">
+            <a:schemeClr val="accent2"/>
+          </a:fillRef>
+          <a:effectRef idx="0">
+            <a:schemeClr val="accent2"/>
+          </a:effectRef>
+          <a:fontRef idx="minor">
+            <a:schemeClr val="lt1"/>
+          </a:fontRef>
+        </p:style>
+        <p:txBody>
+          <a:bodyPr rtlCol="0" anchor="ctr"/>
+          <a:lstStyle/>
+          <a:p>
+            <a:pPr algn="ctr"/>
+            <a:endParaRPr lang="it-IT"/>
+          </a:p>
+        </p:txBody>
+      </p:sp>
+      <p:sp>
+        <p:nvSpPr>
+          <p:cNvPr id="46" name="CasellaDiTesto 45"/>
+          <p:cNvSpPr txBox="1"/>
+          <p:nvPr/>
+        </p:nvSpPr>
+        <p:spPr>
+          <a:xfrm>
+            <a:off x="3010838" y="4949112"/>
+            <a:ext cx="686406" cy="307777"/>
+          </a:xfrm>
+          <a:prstGeom prst="rect">
+            <a:avLst/>
+          </a:prstGeom>
+          <a:noFill/>
+        </p:spPr>
+        <p:txBody>
+          <a:bodyPr wrap="none" rtlCol="0">
+            <a:spAutoFit/>
+          </a:bodyPr>
+          <a:lstStyle/>
+          <a:p>
+            <a:r>
+              <a:rPr lang="it-IT" sz="1400" dirty="0" smtClean="0"/>
+              <a:t>20,377</a:t>
+            </a:r>
+            <a:endParaRPr lang="it-IT" sz="1400" dirty="0"/>
+          </a:p>
+        </p:txBody>
+      </p:sp>
+      <p:sp>
+        <p:nvSpPr>
+          <p:cNvPr id="48" name="Rettangolo 47"/>
+          <p:cNvSpPr/>
+          <p:nvPr/>
+        </p:nvSpPr>
+        <p:spPr>
+          <a:xfrm>
+            <a:off x="705973" y="5091985"/>
+            <a:ext cx="1017914" cy="293915"/>
+          </a:xfrm>
+          <a:prstGeom prst="rect">
+            <a:avLst/>
+          </a:prstGeom>
+        </p:spPr>
+        <p:style>
+          <a:lnRef idx="2">
+            <a:schemeClr val="accent1">
+              <a:shade val="50000"/>
+            </a:schemeClr>
+          </a:lnRef>
+          <a:fillRef idx="1">
+            <a:schemeClr val="accent1"/>
+          </a:fillRef>
+          <a:effectRef idx="0">
+            <a:schemeClr val="accent1"/>
+          </a:effectRef>
+          <a:fontRef idx="minor">
+            <a:schemeClr val="lt1"/>
+          </a:fontRef>
+        </p:style>
+        <p:txBody>
+          <a:bodyPr rtlCol="0" anchor="ctr"/>
+          <a:lstStyle/>
+          <a:p>
+            <a:pPr algn="ctr"/>
+            <a:r>
+              <a:rPr lang="it-IT" sz="1400" dirty="0" smtClean="0"/>
+              <a:t>aggiungi</a:t>
+            </a:r>
+            <a:endParaRPr lang="it-IT" dirty="0"/>
+          </a:p>
+        </p:txBody>
+      </p:sp>
+      <p:cxnSp>
+        <p:nvCxnSpPr>
+          <p:cNvPr id="50" name="Connettore 2 49"/>
+          <p:cNvCxnSpPr/>
+          <p:nvPr/>
+        </p:nvCxnSpPr>
+        <p:spPr>
+          <a:xfrm flipH="1" flipV="1">
+            <a:off x="655228" y="5071957"/>
+            <a:ext cx="3469" cy="313944"/>
+          </a:xfrm>
+          <a:prstGeom prst="straightConnector1">
+            <a:avLst/>
+          </a:prstGeom>
+          <a:ln>
+            <a:headEnd type="triangle"/>
+            <a:tailEnd type="triangle"/>
+          </a:ln>
+        </p:spPr>
+        <p:style>
+          <a:lnRef idx="1">
+            <a:schemeClr val="accent2"/>
+          </a:lnRef>
+          <a:fillRef idx="0">
+            <a:schemeClr val="accent2"/>
+          </a:fillRef>
+          <a:effectRef idx="0">
+            <a:schemeClr val="accent2"/>
+          </a:effectRef>
+          <a:fontRef idx="minor">
+            <a:schemeClr val="tx1"/>
+          </a:fontRef>
+        </p:style>
+      </p:cxnSp>
+      <p:cxnSp>
+        <p:nvCxnSpPr>
+          <p:cNvPr id="51" name="Connettore 2 50"/>
+          <p:cNvCxnSpPr/>
+          <p:nvPr/>
+        </p:nvCxnSpPr>
+        <p:spPr>
+          <a:xfrm>
+            <a:off x="705973" y="5019195"/>
+            <a:ext cx="1017914" cy="0"/>
+          </a:xfrm>
+          <a:prstGeom prst="straightConnector1">
+            <a:avLst/>
+          </a:prstGeom>
+          <a:ln>
+            <a:headEnd type="triangle"/>
+            <a:tailEnd type="triangle"/>
+          </a:ln>
+        </p:spPr>
+        <p:style>
+          <a:lnRef idx="1">
+            <a:schemeClr val="accent2"/>
+          </a:lnRef>
+          <a:fillRef idx="0">
+            <a:schemeClr val="accent2"/>
+          </a:fillRef>
+          <a:effectRef idx="0">
+            <a:schemeClr val="accent2"/>
+          </a:effectRef>
+          <a:fontRef idx="minor">
+            <a:schemeClr val="tx1"/>
+          </a:fontRef>
+        </p:style>
+      </p:cxnSp>
+      <p:sp>
+        <p:nvSpPr>
+          <p:cNvPr id="52" name="CasellaDiTesto 51"/>
+          <p:cNvSpPr txBox="1"/>
+          <p:nvPr/>
+        </p:nvSpPr>
+        <p:spPr>
+          <a:xfrm>
+            <a:off x="967078" y="4789906"/>
+            <a:ext cx="458780" cy="307777"/>
+          </a:xfrm>
+          <a:prstGeom prst="rect">
+            <a:avLst/>
+          </a:prstGeom>
+          <a:noFill/>
+        </p:spPr>
+        <p:txBody>
+          <a:bodyPr wrap="none" rtlCol="0">
+            <a:spAutoFit/>
+          </a:bodyPr>
+          <a:lstStyle/>
+          <a:p>
+            <a:r>
+              <a:rPr lang="it-IT" sz="1400" dirty="0" smtClean="0"/>
+              <a:t>100</a:t>
+            </a:r>
+            <a:endParaRPr lang="it-IT" sz="1400" dirty="0"/>
+          </a:p>
+        </p:txBody>
+      </p:sp>
+      <p:sp>
+        <p:nvSpPr>
+          <p:cNvPr id="53" name="CasellaDiTesto 52"/>
+          <p:cNvSpPr txBox="1"/>
+          <p:nvPr/>
+        </p:nvSpPr>
+        <p:spPr>
+          <a:xfrm>
+            <a:off x="278556" y="5081097"/>
+            <a:ext cx="367408" cy="307777"/>
+          </a:xfrm>
+          <a:prstGeom prst="rect">
+            <a:avLst/>
+          </a:prstGeom>
+          <a:noFill/>
+        </p:spPr>
+        <p:txBody>
+          <a:bodyPr wrap="none" rtlCol="0">
+            <a:spAutoFit/>
+          </a:bodyPr>
+          <a:lstStyle/>
+          <a:p>
+            <a:r>
+              <a:rPr lang="it-IT" sz="1400" dirty="0" smtClean="0"/>
+              <a:t>30</a:t>
+            </a:r>
+            <a:endParaRPr lang="it-IT" sz="1400" dirty="0"/>
+          </a:p>
+        </p:txBody>
+      </p:sp>
+      <p:sp>
+        <p:nvSpPr>
+          <p:cNvPr id="54" name="Ovale 53"/>
+          <p:cNvSpPr/>
+          <p:nvPr/>
+        </p:nvSpPr>
+        <p:spPr>
+          <a:xfrm>
+            <a:off x="4118870" y="5027450"/>
+            <a:ext cx="136171" cy="117798"/>
+          </a:xfrm>
+          <a:prstGeom prst="ellipse">
+            <a:avLst/>
+          </a:prstGeom>
+        </p:spPr>
+        <p:style>
+          <a:lnRef idx="2">
+            <a:schemeClr val="accent2">
+              <a:shade val="50000"/>
+            </a:schemeClr>
+          </a:lnRef>
+          <a:fillRef idx="1">
+            <a:schemeClr val="accent2"/>
+          </a:fillRef>
+          <a:effectRef idx="0">
+            <a:schemeClr val="accent2"/>
+          </a:effectRef>
+          <a:fontRef idx="minor">
+            <a:schemeClr val="lt1"/>
+          </a:fontRef>
+        </p:style>
+        <p:txBody>
+          <a:bodyPr rtlCol="0" anchor="ctr"/>
+          <a:lstStyle/>
+          <a:p>
+            <a:pPr algn="ctr"/>
+            <a:endParaRPr lang="it-IT"/>
+          </a:p>
+        </p:txBody>
+      </p:sp>
+      <p:sp>
+        <p:nvSpPr>
+          <p:cNvPr id="55" name="CasellaDiTesto 54"/>
+          <p:cNvSpPr txBox="1"/>
+          <p:nvPr/>
+        </p:nvSpPr>
+        <p:spPr>
+          <a:xfrm>
+            <a:off x="4200376" y="4948845"/>
+            <a:ext cx="777777" cy="307777"/>
+          </a:xfrm>
+          <a:prstGeom prst="rect">
+            <a:avLst/>
+          </a:prstGeom>
+          <a:noFill/>
+        </p:spPr>
+        <p:txBody>
+          <a:bodyPr wrap="none" rtlCol="0">
+            <a:spAutoFit/>
+          </a:bodyPr>
+          <a:lstStyle/>
+          <a:p>
+            <a:r>
+              <a:rPr lang="it-IT" sz="1400" dirty="0" smtClean="0"/>
+              <a:t>140</a:t>
+            </a:r>
+            <a:r>
+              <a:rPr lang="it-IT" sz="1400" dirty="0" smtClean="0"/>
+              <a:t>,377</a:t>
+            </a:r>
+            <a:endParaRPr lang="it-IT" sz="1400" dirty="0"/>
+          </a:p>
+        </p:txBody>
+      </p:sp>
+      <p:sp>
+        <p:nvSpPr>
+          <p:cNvPr id="56" name="Ovale 55"/>
+          <p:cNvSpPr/>
+          <p:nvPr/>
+        </p:nvSpPr>
+        <p:spPr>
+          <a:xfrm>
+            <a:off x="5308131" y="5049222"/>
+            <a:ext cx="136171" cy="117798"/>
+          </a:xfrm>
+          <a:prstGeom prst="ellipse">
+            <a:avLst/>
+          </a:prstGeom>
+        </p:spPr>
+        <p:style>
+          <a:lnRef idx="2">
+            <a:schemeClr val="accent2">
+              <a:shade val="50000"/>
+            </a:schemeClr>
+          </a:lnRef>
+          <a:fillRef idx="1">
+            <a:schemeClr val="accent2"/>
+          </a:fillRef>
+          <a:effectRef idx="0">
+            <a:schemeClr val="accent2"/>
+          </a:effectRef>
+          <a:fontRef idx="minor">
+            <a:schemeClr val="lt1"/>
+          </a:fontRef>
+        </p:style>
+        <p:txBody>
+          <a:bodyPr rtlCol="0" anchor="ctr"/>
+          <a:lstStyle/>
+          <a:p>
+            <a:pPr algn="ctr"/>
+            <a:endParaRPr lang="it-IT"/>
+          </a:p>
+        </p:txBody>
+      </p:sp>
+      <p:sp>
+        <p:nvSpPr>
+          <p:cNvPr id="57" name="CasellaDiTesto 56"/>
+          <p:cNvSpPr txBox="1"/>
+          <p:nvPr/>
+        </p:nvSpPr>
+        <p:spPr>
+          <a:xfrm>
+            <a:off x="5389637" y="4970617"/>
+            <a:ext cx="777777" cy="307777"/>
+          </a:xfrm>
+          <a:prstGeom prst="rect">
+            <a:avLst/>
+          </a:prstGeom>
+          <a:noFill/>
+        </p:spPr>
+        <p:txBody>
+          <a:bodyPr wrap="none" rtlCol="0">
+            <a:spAutoFit/>
+          </a:bodyPr>
+          <a:lstStyle/>
+          <a:p>
+            <a:r>
+              <a:rPr lang="it-IT" sz="1400" dirty="0" smtClean="0"/>
+              <a:t>260,377</a:t>
+            </a:r>
+            <a:endParaRPr lang="it-IT" sz="1400" dirty="0"/>
+          </a:p>
+        </p:txBody>
+      </p:sp>
+      <p:sp>
+        <p:nvSpPr>
+          <p:cNvPr id="58" name="Ovale 57"/>
+          <p:cNvSpPr/>
+          <p:nvPr/>
+        </p:nvSpPr>
+        <p:spPr>
+          <a:xfrm>
+            <a:off x="6689224" y="5085569"/>
+            <a:ext cx="136171" cy="117798"/>
+          </a:xfrm>
+          <a:prstGeom prst="ellipse">
+            <a:avLst/>
+          </a:prstGeom>
+        </p:spPr>
+        <p:style>
+          <a:lnRef idx="2">
+            <a:schemeClr val="accent2">
+              <a:shade val="50000"/>
+            </a:schemeClr>
+          </a:lnRef>
+          <a:fillRef idx="1">
+            <a:schemeClr val="accent2"/>
+          </a:fillRef>
+          <a:effectRef idx="0">
+            <a:schemeClr val="accent2"/>
+          </a:effectRef>
+          <a:fontRef idx="minor">
+            <a:schemeClr val="lt1"/>
+          </a:fontRef>
+        </p:style>
+        <p:txBody>
+          <a:bodyPr rtlCol="0" anchor="ctr"/>
+          <a:lstStyle/>
+          <a:p>
+            <a:pPr algn="ctr"/>
+            <a:endParaRPr lang="it-IT"/>
+          </a:p>
+        </p:txBody>
+      </p:sp>
+      <p:sp>
+        <p:nvSpPr>
+          <p:cNvPr id="59" name="CasellaDiTesto 58"/>
+          <p:cNvSpPr txBox="1"/>
+          <p:nvPr/>
+        </p:nvSpPr>
+        <p:spPr>
+          <a:xfrm>
+            <a:off x="6763691" y="4962724"/>
+            <a:ext cx="777777" cy="307777"/>
+          </a:xfrm>
+          <a:prstGeom prst="rect">
+            <a:avLst/>
+          </a:prstGeom>
+          <a:noFill/>
+        </p:spPr>
+        <p:txBody>
+          <a:bodyPr wrap="none" rtlCol="0">
+            <a:spAutoFit/>
+          </a:bodyPr>
+          <a:lstStyle/>
+          <a:p>
+            <a:r>
+              <a:rPr lang="it-IT" sz="1400" dirty="0" smtClean="0"/>
+              <a:t>379</a:t>
+            </a:r>
+            <a:r>
+              <a:rPr lang="it-IT" sz="1400" dirty="0" smtClean="0"/>
+              <a:t>,377</a:t>
+            </a:r>
+            <a:endParaRPr lang="it-IT" sz="1400" dirty="0"/>
+          </a:p>
+        </p:txBody>
+      </p:sp>
+      <p:sp>
+        <p:nvSpPr>
+          <p:cNvPr id="60" name="Ovale 59"/>
+          <p:cNvSpPr/>
+          <p:nvPr/>
+        </p:nvSpPr>
+        <p:spPr>
+          <a:xfrm>
+            <a:off x="7871723" y="5041062"/>
+            <a:ext cx="136171" cy="117798"/>
+          </a:xfrm>
+          <a:prstGeom prst="ellipse">
+            <a:avLst/>
+          </a:prstGeom>
+        </p:spPr>
+        <p:style>
+          <a:lnRef idx="2">
+            <a:schemeClr val="accent2">
+              <a:shade val="50000"/>
+            </a:schemeClr>
+          </a:lnRef>
+          <a:fillRef idx="1">
+            <a:schemeClr val="accent2"/>
+          </a:fillRef>
+          <a:effectRef idx="0">
+            <a:schemeClr val="accent2"/>
+          </a:effectRef>
+          <a:fontRef idx="minor">
+            <a:schemeClr val="lt1"/>
+          </a:fontRef>
+        </p:style>
+        <p:txBody>
+          <a:bodyPr rtlCol="0" anchor="ctr"/>
+          <a:lstStyle/>
+          <a:p>
+            <a:pPr algn="ctr"/>
+            <a:endParaRPr lang="it-IT"/>
+          </a:p>
+        </p:txBody>
+      </p:sp>
+      <p:sp>
+        <p:nvSpPr>
+          <p:cNvPr id="61" name="CasellaDiTesto 60"/>
+          <p:cNvSpPr txBox="1"/>
+          <p:nvPr/>
+        </p:nvSpPr>
+        <p:spPr>
+          <a:xfrm>
+            <a:off x="7953229" y="4962457"/>
+            <a:ext cx="777777" cy="307777"/>
+          </a:xfrm>
+          <a:prstGeom prst="rect">
+            <a:avLst/>
+          </a:prstGeom>
+          <a:noFill/>
+        </p:spPr>
+        <p:txBody>
+          <a:bodyPr wrap="none" rtlCol="0">
+            <a:spAutoFit/>
+          </a:bodyPr>
+          <a:lstStyle/>
+          <a:p>
+            <a:r>
+              <a:rPr lang="it-IT" sz="1400" dirty="0" smtClean="0"/>
+              <a:t>499,377</a:t>
+            </a:r>
+            <a:endParaRPr lang="it-IT" sz="1400" dirty="0"/>
+          </a:p>
+        </p:txBody>
+      </p:sp>
+      <p:sp>
+        <p:nvSpPr>
+          <p:cNvPr id="62" name="Ovale 61"/>
+          <p:cNvSpPr/>
+          <p:nvPr/>
+        </p:nvSpPr>
+        <p:spPr>
+          <a:xfrm>
+            <a:off x="9060984" y="5062834"/>
+            <a:ext cx="136171" cy="117798"/>
+          </a:xfrm>
+          <a:prstGeom prst="ellipse">
+            <a:avLst/>
+          </a:prstGeom>
+        </p:spPr>
+        <p:style>
+          <a:lnRef idx="2">
+            <a:schemeClr val="accent2">
+              <a:shade val="50000"/>
+            </a:schemeClr>
+          </a:lnRef>
+          <a:fillRef idx="1">
+            <a:schemeClr val="accent2"/>
+          </a:fillRef>
+          <a:effectRef idx="0">
+            <a:schemeClr val="accent2"/>
+          </a:effectRef>
+          <a:fontRef idx="minor">
+            <a:schemeClr val="lt1"/>
+          </a:fontRef>
+        </p:style>
+        <p:txBody>
+          <a:bodyPr rtlCol="0" anchor="ctr"/>
+          <a:lstStyle/>
+          <a:p>
+            <a:pPr algn="ctr"/>
+            <a:endParaRPr lang="it-IT"/>
+          </a:p>
+        </p:txBody>
+      </p:sp>
+      <p:sp>
+        <p:nvSpPr>
+          <p:cNvPr id="63" name="CasellaDiTesto 62"/>
+          <p:cNvSpPr txBox="1"/>
+          <p:nvPr/>
+        </p:nvSpPr>
+        <p:spPr>
+          <a:xfrm>
+            <a:off x="9142490" y="4984229"/>
+            <a:ext cx="777777" cy="307777"/>
+          </a:xfrm>
+          <a:prstGeom prst="rect">
+            <a:avLst/>
+          </a:prstGeom>
+          <a:noFill/>
+        </p:spPr>
+        <p:txBody>
+          <a:bodyPr wrap="none" rtlCol="0">
+            <a:spAutoFit/>
+          </a:bodyPr>
+          <a:lstStyle/>
+          <a:p>
+            <a:r>
+              <a:rPr lang="it-IT" sz="1400" dirty="0" smtClean="0"/>
+              <a:t>619</a:t>
+            </a:r>
+            <a:r>
+              <a:rPr lang="it-IT" sz="1400" dirty="0" smtClean="0"/>
+              <a:t>,377</a:t>
+            </a:r>
+            <a:endParaRPr lang="it-IT" sz="1400" dirty="0"/>
           </a:p>
         </p:txBody>
       </p:sp>

</xml_diff>